<commit_message>
Added test goals to presentation
</commit_message>
<xml_diff>
--- a/Презентация.pptx
+++ b/Презентация.pptx
@@ -13,7 +13,8 @@
     <p:sldId id="264" r:id="rId7"/>
     <p:sldId id="259" r:id="rId8"/>
     <p:sldId id="260" r:id="rId9"/>
-    <p:sldId id="261" r:id="rId10"/>
+    <p:sldId id="265" r:id="rId10"/>
+    <p:sldId id="261" r:id="rId11"/>
   </p:sldIdLst>
   <p:sldSz cx="10080625" cy="5670550"/>
   <p:notesSz cx="7559675" cy="10691813"/>
@@ -2219,6 +2220,95 @@
 </p:sld>
 </file>
 
+<file path=ppt/slides/slide10.xml><?xml version="1.0" encoding="utf-8"?>
+<p:sld xmlns:a="http://schemas.openxmlformats.org/drawingml/2006/main" xmlns:r="http://schemas.openxmlformats.org/officeDocument/2006/relationships" xmlns:p="http://schemas.openxmlformats.org/presentationml/2006/main">
+  <p:cSld>
+    <p:spTree>
+      <p:nvGrpSpPr>
+        <p:cNvPr id="1" name=""/>
+        <p:cNvGrpSpPr/>
+        <p:nvPr/>
+      </p:nvGrpSpPr>
+      <p:grpSpPr>
+        <a:xfrm>
+          <a:off x="0" y="0"/>
+          <a:ext cx="0" cy="0"/>
+          <a:chOff x="0" y="0"/>
+          <a:chExt cx="0" cy="0"/>
+        </a:xfrm>
+      </p:grpSpPr>
+      <p:sp>
+        <p:nvSpPr>
+          <p:cNvPr id="50" name="TextShape 1"/>
+          <p:cNvSpPr txBox="1"/>
+          <p:nvPr/>
+        </p:nvSpPr>
+        <p:spPr>
+          <a:xfrm>
+            <a:off x="504000" y="226080"/>
+            <a:ext cx="9071640" cy="946440"/>
+          </a:xfrm>
+          <a:prstGeom prst="rect">
+            <a:avLst/>
+          </a:prstGeom>
+          <a:noFill/>
+          <a:ln>
+            <a:noFill/>
+          </a:ln>
+        </p:spPr>
+        <p:txBody>
+          <a:bodyPr lIns="0" tIns="0" rIns="0" bIns="0" anchor="ctr"/>
+          <a:lstStyle/>
+          <a:p>
+            <a:pPr algn="ctr"/>
+            <a:r>
+              <a:rPr lang="ru-RU" sz="4400" b="0" strike="noStrike" spc="-1">
+                <a:latin typeface="Arial"/>
+              </a:rPr>
+              <a:t>Результат</a:t>
+            </a:r>
+          </a:p>
+        </p:txBody>
+      </p:sp>
+      <p:sp>
+        <p:nvSpPr>
+          <p:cNvPr id="51" name="TextShape 2"/>
+          <p:cNvSpPr txBox="1"/>
+          <p:nvPr/>
+        </p:nvSpPr>
+        <p:spPr>
+          <a:xfrm>
+            <a:off x="504000" y="1326600"/>
+            <a:ext cx="9071640" cy="3288240"/>
+          </a:xfrm>
+          <a:prstGeom prst="rect">
+            <a:avLst/>
+          </a:prstGeom>
+          <a:noFill/>
+          <a:ln>
+            <a:noFill/>
+          </a:ln>
+        </p:spPr>
+        <p:txBody>
+          <a:bodyPr lIns="0" tIns="0" rIns="0" bIns="0">
+            <a:normAutofit/>
+          </a:bodyPr>
+          <a:lstStyle/>
+          <a:p>
+            <a:endParaRPr lang="ru-RU" sz="3200" b="0" strike="noStrike" spc="-1">
+              <a:latin typeface="Arial"/>
+            </a:endParaRPr>
+          </a:p>
+        </p:txBody>
+      </p:sp>
+    </p:spTree>
+  </p:cSld>
+  <p:clrMapOvr>
+    <a:masterClrMapping/>
+  </p:clrMapOvr>
+</p:sld>
+</file>
+
 <file path=ppt/slides/slide2.xml><?xml version="1.0" encoding="utf-8"?>
 <p:sld xmlns:a="http://schemas.openxmlformats.org/drawingml/2006/main" xmlns:r="http://schemas.openxmlformats.org/officeDocument/2006/relationships" xmlns:p="http://schemas.openxmlformats.org/presentationml/2006/main">
   <p:cSld>
@@ -3008,69 +3098,89 @@
       </p:grpSpPr>
       <p:sp>
         <p:nvSpPr>
-          <p:cNvPr id="50" name="TextShape 1"/>
-          <p:cNvSpPr txBox="1"/>
-          <p:nvPr/>
-        </p:nvSpPr>
-        <p:spPr>
-          <a:xfrm>
-            <a:off x="504000" y="226080"/>
-            <a:ext cx="9071640" cy="946440"/>
-          </a:xfrm>
-          <a:prstGeom prst="rect">
-            <a:avLst/>
-          </a:prstGeom>
-          <a:noFill/>
-          <a:ln>
-            <a:noFill/>
-          </a:ln>
-        </p:spPr>
-        <p:txBody>
-          <a:bodyPr lIns="0" tIns="0" rIns="0" bIns="0" anchor="ctr"/>
+          <p:cNvPr id="2" name="Заголовок 1">
+            <a:extLst>
+              <a:ext uri="{FF2B5EF4-FFF2-40B4-BE49-F238E27FC236}">
+                <a16:creationId xmlns:a16="http://schemas.microsoft.com/office/drawing/2014/main" id="{7CDDF642-9041-42C4-A917-E6A813A2665A}"/>
+              </a:ext>
+            </a:extLst>
+          </p:cNvPr>
+          <p:cNvSpPr>
+            <a:spLocks noGrp="1"/>
+          </p:cNvSpPr>
+          <p:nvPr>
+            <p:ph type="title"/>
+          </p:nvPr>
+        </p:nvSpPr>
+        <p:spPr/>
+        <p:txBody>
+          <a:bodyPr/>
           <a:lstStyle/>
           <a:p>
             <a:pPr algn="ctr"/>
             <a:r>
-              <a:rPr lang="ru-RU" sz="4400" b="0" strike="noStrike" spc="-1">
-                <a:latin typeface="Arial"/>
-              </a:rPr>
-              <a:t>Результат</a:t>
-            </a:r>
-          </a:p>
-        </p:txBody>
-      </p:sp>
-      <p:sp>
-        <p:nvSpPr>
-          <p:cNvPr id="51" name="TextShape 2"/>
-          <p:cNvSpPr txBox="1"/>
-          <p:nvPr/>
-        </p:nvSpPr>
-        <p:spPr>
-          <a:xfrm>
-            <a:off x="504000" y="1326600"/>
-            <a:ext cx="9071640" cy="3288240"/>
-          </a:xfrm>
-          <a:prstGeom prst="rect">
-            <a:avLst/>
-          </a:prstGeom>
-          <a:noFill/>
-          <a:ln>
-            <a:noFill/>
-          </a:ln>
-        </p:spPr>
-        <p:txBody>
-          <a:bodyPr lIns="0" tIns="0" rIns="0" bIns="0">
-            <a:normAutofit/>
+              <a:rPr lang="ru-RU" dirty="0"/>
+              <a:t>Виды тестов</a:t>
+            </a:r>
+          </a:p>
+        </p:txBody>
+      </p:sp>
+      <p:sp>
+        <p:nvSpPr>
+          <p:cNvPr id="3" name="Текст 2">
+            <a:extLst>
+              <a:ext uri="{FF2B5EF4-FFF2-40B4-BE49-F238E27FC236}">
+                <a16:creationId xmlns:a16="http://schemas.microsoft.com/office/drawing/2014/main" id="{DF9257E2-5BB4-49F4-8F2B-1775BFDC92D7}"/>
+              </a:ext>
+            </a:extLst>
+          </p:cNvPr>
+          <p:cNvSpPr>
+            <a:spLocks noGrp="1"/>
+          </p:cNvSpPr>
+          <p:nvPr>
+            <p:ph type="body"/>
+          </p:nvPr>
+        </p:nvSpPr>
+        <p:spPr/>
+        <p:txBody>
+          <a:bodyPr>
+            <a:normAutofit lnSpcReduction="10000"/>
           </a:bodyPr>
           <a:lstStyle/>
           <a:p>
-            <a:endParaRPr lang="ru-RU" sz="3200" b="0" strike="noStrike" spc="-1">
-              <a:latin typeface="Arial"/>
-            </a:endParaRPr>
+            <a:r>
+              <a:rPr lang="ru-RU" dirty="0"/>
+              <a:t>Повторение результатов из оригинальных статей по методу выбора ковариаций</a:t>
+            </a:r>
+          </a:p>
+          <a:p>
+            <a:r>
+              <a:rPr lang="ru-RU" dirty="0"/>
+              <a:t>Тесты на случайных данных</a:t>
+            </a:r>
+          </a:p>
+          <a:p>
+            <a:pPr lvl="1"/>
+            <a:r>
+              <a:rPr lang="ru-RU" dirty="0"/>
+              <a:t>Построение ковариационной матрицы по выборочной ковариации из случайного распределения и сравнение на соответствие параметрам распределения</a:t>
+            </a:r>
+          </a:p>
+          <a:p>
+            <a:pPr lvl="1"/>
+            <a:r>
+              <a:rPr lang="ru-RU" dirty="0"/>
+              <a:t>Построение ковариационной матрицы по зашумленной истинной ковариационной матрице и сравнение на соответствие</a:t>
+            </a:r>
           </a:p>
         </p:txBody>
       </p:sp>
     </p:spTree>
+    <p:extLst>
+      <p:ext uri="{BB962C8B-B14F-4D97-AF65-F5344CB8AC3E}">
+        <p14:creationId xmlns:p14="http://schemas.microsoft.com/office/powerpoint/2010/main" val="4124235158"/>
+      </p:ext>
+    </p:extLst>
   </p:cSld>
   <p:clrMapOvr>
     <a:masterClrMapping/>

</xml_diff>